<commit_message>
Update to use PsN-4.7.0 and include vignette about incorporating PsN rplots .Rmd files as child documents
</commit_message>
<xml_diff>
--- a/rspeaksnonmem.pptx
+++ b/rspeaksnonmem.pptx
@@ -5,16 +5,16 @@
     <p:sldMasterId id="2147483648" r:id="rId1"/>
   </p:sldMasterIdLst>
   <p:sldIdLst>
-    <p:sldId id="264" r:id="rId2"/>
-    <p:sldId id="256" r:id="rId3"/>
-    <p:sldId id="257" r:id="rId4"/>
-    <p:sldId id="259" r:id="rId5"/>
-    <p:sldId id="265" r:id="rId6"/>
-    <p:sldId id="258" r:id="rId7"/>
-    <p:sldId id="260" r:id="rId8"/>
-    <p:sldId id="261" r:id="rId9"/>
-    <p:sldId id="262" r:id="rId10"/>
-    <p:sldId id="263" r:id="rId11"/>
+    <p:sldId id="256" r:id="rId2"/>
+    <p:sldId id="257" r:id="rId3"/>
+    <p:sldId id="259" r:id="rId4"/>
+    <p:sldId id="265" r:id="rId5"/>
+    <p:sldId id="258" r:id="rId6"/>
+    <p:sldId id="260" r:id="rId7"/>
+    <p:sldId id="261" r:id="rId8"/>
+    <p:sldId id="262" r:id="rId9"/>
+    <p:sldId id="263" r:id="rId10"/>
+    <p:sldId id="266" r:id="rId11"/>
   </p:sldIdLst>
   <p:sldSz cx="9144000" cy="5143500" type="screen16x9"/>
   <p:notesSz cx="6858000" cy="9144000"/>
@@ -297,7 +297,7 @@
           <a:p>
             <a:fld id="{8BCD537C-BC60-44AE-BC93-17042691AFEC}" type="datetimeFigureOut">
               <a:rPr lang="en-GB" smtClean="0"/>
-              <a:t>11/04/2017</a:t>
+              <a:t>12/04/2017</a:t>
             </a:fld>
             <a:endParaRPr lang="en-GB"/>
           </a:p>
@@ -467,7 +467,7 @@
           <a:p>
             <a:fld id="{8BCD537C-BC60-44AE-BC93-17042691AFEC}" type="datetimeFigureOut">
               <a:rPr lang="en-GB" smtClean="0"/>
-              <a:t>11/04/2017</a:t>
+              <a:t>12/04/2017</a:t>
             </a:fld>
             <a:endParaRPr lang="en-GB"/>
           </a:p>
@@ -647,7 +647,7 @@
           <a:p>
             <a:fld id="{8BCD537C-BC60-44AE-BC93-17042691AFEC}" type="datetimeFigureOut">
               <a:rPr lang="en-GB" smtClean="0"/>
-              <a:t>11/04/2017</a:t>
+              <a:t>12/04/2017</a:t>
             </a:fld>
             <a:endParaRPr lang="en-GB"/>
           </a:p>
@@ -817,7 +817,7 @@
           <a:p>
             <a:fld id="{8BCD537C-BC60-44AE-BC93-17042691AFEC}" type="datetimeFigureOut">
               <a:rPr lang="en-GB" smtClean="0"/>
-              <a:t>11/04/2017</a:t>
+              <a:t>12/04/2017</a:t>
             </a:fld>
             <a:endParaRPr lang="en-GB"/>
           </a:p>
@@ -1063,7 +1063,7 @@
           <a:p>
             <a:fld id="{8BCD537C-BC60-44AE-BC93-17042691AFEC}" type="datetimeFigureOut">
               <a:rPr lang="en-GB" smtClean="0"/>
-              <a:t>11/04/2017</a:t>
+              <a:t>12/04/2017</a:t>
             </a:fld>
             <a:endParaRPr lang="en-GB"/>
           </a:p>
@@ -1351,7 +1351,7 @@
           <a:p>
             <a:fld id="{8BCD537C-BC60-44AE-BC93-17042691AFEC}" type="datetimeFigureOut">
               <a:rPr lang="en-GB" smtClean="0"/>
-              <a:t>11/04/2017</a:t>
+              <a:t>12/04/2017</a:t>
             </a:fld>
             <a:endParaRPr lang="en-GB"/>
           </a:p>
@@ -1773,7 +1773,7 @@
           <a:p>
             <a:fld id="{8BCD537C-BC60-44AE-BC93-17042691AFEC}" type="datetimeFigureOut">
               <a:rPr lang="en-GB" smtClean="0"/>
-              <a:t>11/04/2017</a:t>
+              <a:t>12/04/2017</a:t>
             </a:fld>
             <a:endParaRPr lang="en-GB"/>
           </a:p>
@@ -1891,7 +1891,7 @@
           <a:p>
             <a:fld id="{8BCD537C-BC60-44AE-BC93-17042691AFEC}" type="datetimeFigureOut">
               <a:rPr lang="en-GB" smtClean="0"/>
-              <a:t>11/04/2017</a:t>
+              <a:t>12/04/2017</a:t>
             </a:fld>
             <a:endParaRPr lang="en-GB"/>
           </a:p>
@@ -1986,7 +1986,7 @@
           <a:p>
             <a:fld id="{8BCD537C-BC60-44AE-BC93-17042691AFEC}" type="datetimeFigureOut">
               <a:rPr lang="en-GB" smtClean="0"/>
-              <a:t>11/04/2017</a:t>
+              <a:t>12/04/2017</a:t>
             </a:fld>
             <a:endParaRPr lang="en-GB"/>
           </a:p>
@@ -2263,7 +2263,7 @@
           <a:p>
             <a:fld id="{8BCD537C-BC60-44AE-BC93-17042691AFEC}" type="datetimeFigureOut">
               <a:rPr lang="en-GB" smtClean="0"/>
-              <a:t>11/04/2017</a:t>
+              <a:t>12/04/2017</a:t>
             </a:fld>
             <a:endParaRPr lang="en-GB"/>
           </a:p>
@@ -2516,7 +2516,7 @@
           <a:p>
             <a:fld id="{8BCD537C-BC60-44AE-BC93-17042691AFEC}" type="datetimeFigureOut">
               <a:rPr lang="en-GB" smtClean="0"/>
-              <a:t>11/04/2017</a:t>
+              <a:t>12/04/2017</a:t>
             </a:fld>
             <a:endParaRPr lang="en-GB"/>
           </a:p>
@@ -2729,7 +2729,7 @@
           <a:p>
             <a:fld id="{8BCD537C-BC60-44AE-BC93-17042691AFEC}" type="datetimeFigureOut">
               <a:rPr lang="en-GB" smtClean="0"/>
-              <a:t>11/04/2017</a:t>
+              <a:t>12/04/2017</a:t>
             </a:fld>
             <a:endParaRPr lang="en-GB"/>
           </a:p>
@@ -3104,40 +3104,82 @@
           <a:chExt cx="0" cy="0"/>
         </a:xfrm>
       </p:grpSpPr>
-      <p:pic>
-        <p:nvPicPr>
-          <p:cNvPr id="5" name="Picture 4"/>
-          <p:cNvPicPr>
-            <a:picLocks noChangeAspect="1"/>
-          </p:cNvPicPr>
-          <p:nvPr/>
-        </p:nvPicPr>
-        <p:blipFill>
-          <a:blip r:embed="rId2">
-            <a:extLst>
-              <a:ext uri="{28A0092B-C50C-407E-A947-70E740481C1C}">
-                <a14:useLocalDpi xmlns:a14="http://schemas.microsoft.com/office/drawing/2010/main" val="0"/>
-              </a:ext>
-            </a:extLst>
-          </a:blip>
-          <a:stretch>
-            <a:fillRect/>
-          </a:stretch>
-        </p:blipFill>
-        <p:spPr>
-          <a:xfrm>
-            <a:off x="0" y="0"/>
-            <a:ext cx="9144000" cy="5143500"/>
-          </a:xfrm>
-          <a:prstGeom prst="rect">
-            <a:avLst/>
-          </a:prstGeom>
-        </p:spPr>
-      </p:pic>
+      <p:sp>
+        <p:nvSpPr>
+          <p:cNvPr id="2" name="Title 1"/>
+          <p:cNvSpPr>
+            <a:spLocks noGrp="1"/>
+          </p:cNvSpPr>
+          <p:nvPr>
+            <p:ph type="ctrTitle"/>
+          </p:nvPr>
+        </p:nvSpPr>
+        <p:spPr/>
+        <p:txBody>
+          <a:bodyPr/>
+          <a:lstStyle/>
+          <a:p>
+            <a:r>
+              <a:rPr lang="en-GB" dirty="0" err="1" smtClean="0"/>
+              <a:t>rspeaksnonmem</a:t>
+            </a:r>
+            <a:endParaRPr lang="en-GB" dirty="0"/>
+          </a:p>
+        </p:txBody>
+      </p:sp>
+      <p:sp>
+        <p:nvSpPr>
+          <p:cNvPr id="3" name="Subtitle 2"/>
+          <p:cNvSpPr>
+            <a:spLocks noGrp="1"/>
+          </p:cNvSpPr>
+          <p:nvPr>
+            <p:ph type="subTitle" idx="1"/>
+          </p:nvPr>
+        </p:nvSpPr>
+        <p:spPr/>
+        <p:txBody>
+          <a:bodyPr>
+            <a:normAutofit fontScale="85000" lnSpcReduction="20000"/>
+          </a:bodyPr>
+          <a:lstStyle/>
+          <a:p>
+            <a:r>
+              <a:rPr lang="en-GB" dirty="0" smtClean="0"/>
+              <a:t>Prepared by Mike K Smith (Pfizer)</a:t>
+            </a:r>
+          </a:p>
+          <a:p>
+            <a:r>
+              <a:rPr lang="en-GB" dirty="0" err="1" smtClean="0"/>
+              <a:t>ISOP</a:t>
+            </a:r>
+            <a:r>
+              <a:rPr lang="en-GB" dirty="0" smtClean="0"/>
+              <a:t> Study Group</a:t>
+            </a:r>
+          </a:p>
+          <a:p>
+            <a:r>
+              <a:rPr lang="en-GB" dirty="0" smtClean="0"/>
+              <a:t>12</a:t>
+            </a:r>
+            <a:r>
+              <a:rPr lang="en-GB" baseline="30000" dirty="0" smtClean="0"/>
+              <a:t>th</a:t>
+            </a:r>
+            <a:r>
+              <a:rPr lang="en-GB" dirty="0" smtClean="0"/>
+              <a:t> April 2017</a:t>
+            </a:r>
+            <a:endParaRPr lang="en-GB" dirty="0"/>
+          </a:p>
+        </p:txBody>
+      </p:sp>
     </p:spTree>
     <p:extLst>
       <p:ext uri="{BB962C8B-B14F-4D97-AF65-F5344CB8AC3E}">
-        <p14:creationId xmlns:p14="http://schemas.microsoft.com/office/powerpoint/2010/main" val="1343816423"/>
+        <p14:creationId xmlns:p14="http://schemas.microsoft.com/office/powerpoint/2010/main" val="3576383921"/>
       </p:ext>
     </p:extLst>
   </p:cSld>
@@ -3188,7 +3230,11 @@
           <a:p>
             <a:r>
               <a:rPr lang="en-GB" dirty="0" smtClean="0"/>
-              <a:t>Write your own workflow!</a:t>
+              <a:t>Where to find </a:t>
+            </a:r>
+            <a:r>
+              <a:rPr lang="en-GB" dirty="0" err="1" smtClean="0"/>
+              <a:t>rspeaksnonmem</a:t>
             </a:r>
             <a:endParaRPr lang="en-GB" dirty="0"/>
           </a:p>
@@ -3206,44 +3252,126 @@
         </p:nvSpPr>
         <p:spPr/>
         <p:txBody>
-          <a:bodyPr/>
-          <a:lstStyle/>
-          <a:p>
-            <a:r>
-              <a:rPr lang="en-GB" dirty="0" smtClean="0"/>
-              <a:t>What steps do you want to take on EACH </a:t>
-            </a:r>
+          <a:bodyPr>
+            <a:normAutofit fontScale="77500" lnSpcReduction="20000"/>
+          </a:bodyPr>
+          <a:lstStyle/>
+          <a:p>
             <a:r>
               <a:rPr lang="en-GB" dirty="0" err="1" smtClean="0"/>
-              <a:t>NONMEM</a:t>
-            </a:r>
-            <a:r>
-              <a:rPr lang="en-GB" dirty="0" smtClean="0"/>
-              <a:t> model?</a:t>
-            </a:r>
-          </a:p>
-          <a:p>
-            <a:r>
-              <a:rPr lang="en-GB" dirty="0" smtClean="0"/>
-              <a:t>Create R markdown documents using </a:t>
+              <a:t>Github</a:t>
+            </a:r>
+            <a:r>
+              <a:rPr lang="en-GB" dirty="0" smtClean="0"/>
+              <a:t>:</a:t>
+            </a:r>
+          </a:p>
+          <a:p>
+            <a:pPr lvl="1"/>
+            <a:r>
+              <a:rPr lang="en-GB" dirty="0">
+                <a:hlinkClick r:id="rId2"/>
+              </a:rPr>
+              <a:t>https://</a:t>
+            </a:r>
+            <a:r>
+              <a:rPr lang="en-GB" dirty="0" smtClean="0">
+                <a:hlinkClick r:id="rId2"/>
+              </a:rPr>
+              <a:t>github.com/MikeKSmith/rspeaksnonmem</a:t>
+            </a:r>
+            <a:endParaRPr lang="en-GB" dirty="0" smtClean="0"/>
+          </a:p>
+          <a:p>
+            <a:pPr lvl="1"/>
+            <a:r>
+              <a:rPr lang="en-GB" dirty="0">
+                <a:hlinkClick r:id="rId3"/>
+              </a:rPr>
+              <a:t>https://</a:t>
+            </a:r>
+            <a:r>
+              <a:rPr lang="en-GB" dirty="0" smtClean="0">
+                <a:hlinkClick r:id="rId3"/>
+              </a:rPr>
+              <a:t>github.com/MikeKSmith/RNMImport</a:t>
+            </a:r>
+            <a:r>
+              <a:rPr lang="en-GB" dirty="0" smtClean="0"/>
+              <a:t> </a:t>
+            </a:r>
+          </a:p>
+          <a:p>
+            <a:r>
+              <a:rPr lang="en-GB" dirty="0" smtClean="0"/>
+              <a:t>Status:</a:t>
+            </a:r>
+          </a:p>
+          <a:p>
+            <a:pPr lvl="1"/>
+            <a:r>
+              <a:rPr lang="en-GB" dirty="0" smtClean="0"/>
+              <a:t>Work in progress</a:t>
+            </a:r>
+          </a:p>
+          <a:p>
+            <a:pPr lvl="1"/>
+            <a:r>
+              <a:rPr lang="en-GB" dirty="0" smtClean="0"/>
+              <a:t>Will be merging today’s code ASAP</a:t>
+            </a:r>
+          </a:p>
+          <a:p>
+            <a:pPr lvl="1"/>
+            <a:r>
+              <a:rPr lang="en-GB" dirty="0" smtClean="0"/>
+              <a:t>Some additional testing and building required to get to </a:t>
             </a:r>
             <a:r>
               <a:rPr lang="en-GB" dirty="0" err="1" smtClean="0"/>
-              <a:t>knitr</a:t>
-            </a:r>
-            <a:r>
-              <a:rPr lang="en-GB" dirty="0" smtClean="0"/>
-              <a:t> to summarise each run in HTML?</a:t>
-            </a:r>
-          </a:p>
-          <a:p>
-            <a:r>
-              <a:rPr lang="en-GB" dirty="0" smtClean="0"/>
-              <a:t>Create a Shiny application to run and </a:t>
-            </a:r>
-            <a:r>
-              <a:rPr lang="en-GB" smtClean="0"/>
-              <a:t>review output?</a:t>
+              <a:t>CRAN</a:t>
+            </a:r>
+            <a:r>
+              <a:rPr lang="en-GB" dirty="0" smtClean="0"/>
+              <a:t> standard.</a:t>
+            </a:r>
+          </a:p>
+          <a:p>
+            <a:pPr lvl="1"/>
+            <a:r>
+              <a:rPr lang="en-GB" dirty="0" smtClean="0"/>
+              <a:t>Contributions welcome! (via </a:t>
+            </a:r>
+            <a:r>
+              <a:rPr lang="en-GB" dirty="0" err="1" smtClean="0"/>
+              <a:t>Github</a:t>
+            </a:r>
+            <a:r>
+              <a:rPr lang="en-GB" dirty="0" smtClean="0"/>
+              <a:t> fork, commit, pull request)</a:t>
+            </a:r>
+          </a:p>
+          <a:p>
+            <a:pPr lvl="1"/>
+            <a:r>
+              <a:rPr lang="en-GB" dirty="0" smtClean="0"/>
+              <a:t>Bugs, issues, feature requests via </a:t>
+            </a:r>
+            <a:r>
+              <a:rPr lang="en-GB" dirty="0" err="1" smtClean="0">
+                <a:hlinkClick r:id="rId4"/>
+              </a:rPr>
+              <a:t>Github</a:t>
+            </a:r>
+            <a:r>
+              <a:rPr lang="en-GB" dirty="0" smtClean="0">
+                <a:hlinkClick r:id="rId4"/>
+              </a:rPr>
+              <a:t> Issues</a:t>
+            </a:r>
+            <a:r>
+              <a:rPr lang="en-GB" dirty="0" smtClean="0"/>
+              <a:t>.</a:t>
             </a:r>
             <a:endParaRPr lang="en-GB" dirty="0"/>
           </a:p>
@@ -3252,7 +3380,7 @@
     </p:spTree>
     <p:extLst>
       <p:ext uri="{BB962C8B-B14F-4D97-AF65-F5344CB8AC3E}">
-        <p14:creationId xmlns:p14="http://schemas.microsoft.com/office/powerpoint/2010/main" val="2077010124"/>
+        <p14:creationId xmlns:p14="http://schemas.microsoft.com/office/powerpoint/2010/main" val="1956177932"/>
       </p:ext>
     </p:extLst>
   </p:cSld>
@@ -3286,17 +3414,17 @@
             <a:spLocks noGrp="1"/>
           </p:cNvSpPr>
           <p:nvPr>
-            <p:ph type="ctrTitle"/>
-          </p:nvPr>
-        </p:nvSpPr>
-        <p:spPr/>
-        <p:txBody>
-          <a:bodyPr/>
-          <a:lstStyle/>
-          <a:p>
-            <a:r>
-              <a:rPr lang="en-GB" dirty="0" err="1" smtClean="0"/>
-              <a:t>rspeaksnonmem</a:t>
+            <p:ph type="title"/>
+          </p:nvPr>
+        </p:nvSpPr>
+        <p:spPr/>
+        <p:txBody>
+          <a:bodyPr/>
+          <a:lstStyle/>
+          <a:p>
+            <a:r>
+              <a:rPr lang="en-GB" dirty="0" smtClean="0"/>
+              <a:t>Problem statement</a:t>
             </a:r>
             <a:endParaRPr lang="en-GB" dirty="0"/>
           </a:p>
@@ -3304,12 +3432,12 @@
       </p:sp>
       <p:sp>
         <p:nvSpPr>
-          <p:cNvPr id="3" name="Subtitle 2"/>
-          <p:cNvSpPr>
-            <a:spLocks noGrp="1"/>
-          </p:cNvSpPr>
-          <p:nvPr>
-            <p:ph type="subTitle" idx="1"/>
+          <p:cNvPr id="3" name="Content Placeholder 2"/>
+          <p:cNvSpPr>
+            <a:spLocks noGrp="1"/>
+          </p:cNvSpPr>
+          <p:nvPr>
+            <p:ph idx="1"/>
           </p:nvPr>
         </p:nvSpPr>
         <p:spPr/>
@@ -3321,40 +3449,76 @@
           <a:p>
             <a:r>
               <a:rPr lang="en-GB" dirty="0" smtClean="0"/>
-              <a:t>Prepared by Mike K Smith (Pfizer)</a:t>
-            </a:r>
-          </a:p>
-          <a:p>
+              <a:t>Want reproducible workflow for modelling and simulation tasks based within R.</a:t>
+            </a:r>
+          </a:p>
+          <a:p>
+            <a:pPr lvl="1"/>
+            <a:r>
+              <a:rPr lang="en-GB" dirty="0" smtClean="0"/>
+              <a:t>Estimation with </a:t>
+            </a:r>
             <a:r>
               <a:rPr lang="en-GB" dirty="0" err="1" smtClean="0"/>
-              <a:t>ISOP</a:t>
-            </a:r>
-            <a:r>
-              <a:rPr lang="en-GB" dirty="0" smtClean="0"/>
-              <a:t> Study Group</a:t>
-            </a:r>
-          </a:p>
-          <a:p>
-            <a:r>
-              <a:rPr lang="en-GB" dirty="0" smtClean="0"/>
-              <a:t>12</a:t>
-            </a:r>
-            <a:r>
-              <a:rPr lang="en-GB" baseline="30000" dirty="0" smtClean="0"/>
-              <a:t>th</a:t>
-            </a:r>
-            <a:r>
-              <a:rPr lang="en-GB" dirty="0" smtClean="0"/>
-              <a:t> April 2017</a:t>
-            </a:r>
+              <a:t>NONMEM</a:t>
+            </a:r>
+            <a:endParaRPr lang="en-GB" dirty="0" smtClean="0"/>
+          </a:p>
+          <a:p>
+            <a:pPr lvl="1"/>
+            <a:r>
+              <a:rPr lang="en-GB" dirty="0" smtClean="0"/>
+              <a:t>Model qualification (diagnostics)</a:t>
+            </a:r>
+          </a:p>
+          <a:p>
+            <a:pPr lvl="1"/>
+            <a:r>
+              <a:rPr lang="en-GB" dirty="0" smtClean="0"/>
+              <a:t>Update model with final estimates</a:t>
+            </a:r>
+          </a:p>
+          <a:p>
+            <a:pPr lvl="1"/>
+            <a:r>
+              <a:rPr lang="en-GB" dirty="0" err="1" smtClean="0"/>
+              <a:t>VPC</a:t>
+            </a:r>
+            <a:endParaRPr lang="en-GB" dirty="0" smtClean="0"/>
+          </a:p>
+          <a:p>
+            <a:pPr lvl="1"/>
             <a:endParaRPr lang="en-GB" dirty="0"/>
+          </a:p>
+          <a:p>
+            <a:pPr lvl="1"/>
+            <a:r>
+              <a:rPr lang="en-GB" dirty="0" smtClean="0"/>
+              <a:t>Reproducible report of run steps with </a:t>
+            </a:r>
+            <a:r>
+              <a:rPr lang="en-GB" dirty="0" err="1" smtClean="0"/>
+              <a:t>knitr</a:t>
+            </a:r>
+            <a:r>
+              <a:rPr lang="en-GB" dirty="0" smtClean="0"/>
+              <a:t>.</a:t>
+            </a:r>
+            <a:endParaRPr lang="en-GB" dirty="0"/>
+          </a:p>
+          <a:p>
+            <a:pPr lvl="1"/>
+            <a:r>
+              <a:rPr lang="en-GB" dirty="0" smtClean="0"/>
+              <a:t>Potential for Shiny app control etc.</a:t>
+            </a:r>
           </a:p>
         </p:txBody>
       </p:sp>
     </p:spTree>
     <p:extLst>
       <p:ext uri="{BB962C8B-B14F-4D97-AF65-F5344CB8AC3E}">
-        <p14:creationId xmlns:p14="http://schemas.microsoft.com/office/powerpoint/2010/main" val="3576383921"/>
+        <p14:creationId xmlns:p14="http://schemas.microsoft.com/office/powerpoint/2010/main" val="1891067011"/>
       </p:ext>
     </p:extLst>
   </p:cSld>
@@ -3400,14 +3564,28 @@
         </p:nvSpPr>
         <p:spPr/>
         <p:txBody>
-          <a:bodyPr/>
-          <a:lstStyle/>
-          <a:p>
-            <a:r>
-              <a:rPr lang="en-GB" dirty="0" smtClean="0"/>
-              <a:t>Problem statement</a:t>
-            </a:r>
-            <a:endParaRPr lang="en-GB" dirty="0"/>
+          <a:bodyPr>
+            <a:normAutofit fontScale="90000"/>
+          </a:bodyPr>
+          <a:lstStyle/>
+          <a:p>
+            <a:r>
+              <a:rPr lang="en-GB" sz="3600" dirty="0" err="1" smtClean="0"/>
+              <a:t>rspeaksnonmem</a:t>
+            </a:r>
+            <a:r>
+              <a:rPr lang="en-GB" sz="3600" dirty="0" smtClean="0"/>
+              <a:t> ≠ Perl speaks </a:t>
+            </a:r>
+            <a:r>
+              <a:rPr lang="en-GB" sz="3600" dirty="0" err="1" smtClean="0"/>
+              <a:t>NONMEM</a:t>
+            </a:r>
+            <a:r>
+              <a:rPr lang="en-GB" sz="3600" dirty="0" smtClean="0"/>
+              <a:t> in R</a:t>
+            </a:r>
+            <a:endParaRPr lang="en-GB" sz="3600" dirty="0"/>
           </a:p>
         </p:txBody>
       </p:sp>
@@ -3423,75 +3601,87 @@
         </p:nvSpPr>
         <p:spPr/>
         <p:txBody>
-          <a:bodyPr>
-            <a:normAutofit fontScale="85000" lnSpcReduction="20000"/>
-          </a:bodyPr>
-          <a:lstStyle/>
-          <a:p>
-            <a:r>
-              <a:rPr lang="en-GB" dirty="0" smtClean="0"/>
-              <a:t>Want reproducible workflow for modelling and simulation tasks based within R.</a:t>
-            </a:r>
-          </a:p>
-          <a:p>
-            <a:pPr lvl="1"/>
-            <a:r>
-              <a:rPr lang="en-GB" dirty="0" smtClean="0"/>
-              <a:t>Estimation with </a:t>
+          <a:bodyPr/>
+          <a:lstStyle/>
+          <a:p>
+            <a:r>
+              <a:rPr lang="en-GB" dirty="0" smtClean="0"/>
+              <a:t>Works </a:t>
+            </a:r>
+            <a:r>
+              <a:rPr lang="en-GB" b="1" i="1" dirty="0" smtClean="0">
+                <a:solidFill>
+                  <a:srgbClr val="FF0000"/>
+                </a:solidFill>
+              </a:rPr>
+              <a:t>WITH</a:t>
+            </a:r>
+            <a:r>
+              <a:rPr lang="en-GB" dirty="0" smtClean="0">
+                <a:solidFill>
+                  <a:srgbClr val="FF0000"/>
+                </a:solidFill>
+              </a:rPr>
+              <a:t> </a:t>
+            </a:r>
+            <a:r>
+              <a:rPr lang="en-GB" dirty="0" err="1" smtClean="0"/>
+              <a:t>PsN</a:t>
+            </a:r>
+            <a:r>
+              <a:rPr lang="en-GB" dirty="0" smtClean="0"/>
+              <a:t> rather than replacing.</a:t>
+            </a:r>
+            <a:endParaRPr lang="en-GB" b="1" i="1" dirty="0" smtClean="0"/>
+          </a:p>
+          <a:p>
+            <a:r>
+              <a:rPr lang="en-GB" dirty="0" smtClean="0"/>
+              <a:t>Execute </a:t>
             </a:r>
             <a:r>
               <a:rPr lang="en-GB" dirty="0" err="1" smtClean="0"/>
               <a:t>NONMEM</a:t>
             </a:r>
-            <a:endParaRPr lang="en-GB" dirty="0" smtClean="0"/>
-          </a:p>
-          <a:p>
-            <a:pPr lvl="1"/>
-            <a:r>
-              <a:rPr lang="en-GB" dirty="0" smtClean="0"/>
-              <a:t>Model qualification (diagnostics)</a:t>
-            </a:r>
-          </a:p>
-          <a:p>
-            <a:pPr lvl="1"/>
-            <a:r>
-              <a:rPr lang="en-GB" dirty="0" smtClean="0"/>
-              <a:t>Update model with final estimates</a:t>
-            </a:r>
-          </a:p>
-          <a:p>
-            <a:pPr lvl="1"/>
+            <a:r>
+              <a:rPr lang="en-GB" dirty="0" smtClean="0"/>
+              <a:t> steps from R</a:t>
+            </a:r>
+          </a:p>
+          <a:p>
+            <a:r>
+              <a:rPr lang="en-GB" dirty="0" smtClean="0"/>
+              <a:t>Run </a:t>
+            </a:r>
             <a:r>
               <a:rPr lang="en-GB" dirty="0" err="1" smtClean="0"/>
-              <a:t>VPC</a:t>
-            </a:r>
-            <a:endParaRPr lang="en-GB" dirty="0" smtClean="0"/>
-          </a:p>
-          <a:p>
-            <a:pPr lvl="1"/>
-            <a:endParaRPr lang="en-GB" dirty="0"/>
-          </a:p>
-          <a:p>
-            <a:pPr lvl="1"/>
-            <a:r>
-              <a:rPr lang="en-GB" dirty="0" smtClean="0"/>
-              <a:t>Reproducible report of run steps with </a:t>
+              <a:t>PsN</a:t>
+            </a:r>
+            <a:r>
+              <a:rPr lang="en-GB" dirty="0" smtClean="0"/>
+              <a:t> routines from R.</a:t>
+            </a:r>
+          </a:p>
+          <a:p>
+            <a:r>
+              <a:rPr lang="en-GB" dirty="0" smtClean="0"/>
+              <a:t>Workflow of </a:t>
             </a:r>
             <a:r>
               <a:rPr lang="en-GB" dirty="0" err="1" smtClean="0"/>
-              <a:t>knitr</a:t>
-            </a:r>
-            <a:r>
-              <a:rPr lang="en-GB" dirty="0" smtClean="0"/>
-              <a:t>.</a:t>
-            </a:r>
-            <a:endParaRPr lang="en-GB" dirty="0"/>
-          </a:p>
-          <a:p>
-            <a:pPr lvl="1"/>
-            <a:r>
-              <a:rPr lang="en-GB" dirty="0" smtClean="0"/>
-              <a:t>Potential for Shiny app control etc.</a:t>
+              <a:t>PsN</a:t>
+            </a:r>
+            <a:r>
+              <a:rPr lang="en-GB" dirty="0" smtClean="0"/>
+              <a:t> could be extended with </a:t>
+            </a:r>
+            <a:r>
+              <a:rPr lang="en-GB" dirty="0" err="1" smtClean="0"/>
+              <a:t>rspeaksnonmem</a:t>
+            </a:r>
+            <a:r>
+              <a:rPr lang="en-GB" dirty="0" smtClean="0"/>
+              <a:t> but it doesn’t replace functionality.</a:t>
             </a:r>
           </a:p>
         </p:txBody>
@@ -3499,7 +3689,7 @@
     </p:spTree>
     <p:extLst>
       <p:ext uri="{BB962C8B-B14F-4D97-AF65-F5344CB8AC3E}">
-        <p14:creationId xmlns:p14="http://schemas.microsoft.com/office/powerpoint/2010/main" val="1891067011"/>
+        <p14:creationId xmlns:p14="http://schemas.microsoft.com/office/powerpoint/2010/main" val="1973562726"/>
       </p:ext>
     </p:extLst>
   </p:cSld>
@@ -3545,65 +3735,20 @@
         </p:nvSpPr>
         <p:spPr/>
         <p:txBody>
-          <a:bodyPr>
-            <a:normAutofit fontScale="90000"/>
-          </a:bodyPr>
-          <a:lstStyle/>
-          <a:p>
-            <a:r>
-              <a:rPr lang="en-GB" sz="3600" dirty="0" err="1" smtClean="0"/>
-              <a:t>rspeaksnonmem</a:t>
-            </a:r>
-            <a:r>
-              <a:rPr lang="en-GB" sz="3600" dirty="0" smtClean="0"/>
-              <a:t> ≠ Perl speaks </a:t>
-            </a:r>
-            <a:r>
-              <a:rPr lang="en-GB" sz="3600" dirty="0" err="1" smtClean="0"/>
+          <a:bodyPr/>
+          <a:lstStyle/>
+          <a:p>
+            <a:r>
+              <a:rPr lang="en-GB" dirty="0" smtClean="0"/>
+              <a:t>Running </a:t>
+            </a:r>
+            <a:r>
+              <a:rPr lang="en-GB" dirty="0" err="1" smtClean="0"/>
               <a:t>NONMEM</a:t>
             </a:r>
             <a:r>
-              <a:rPr lang="en-GB" sz="3600" dirty="0" smtClean="0"/>
-              <a:t> in R</a:t>
-            </a:r>
-            <a:endParaRPr lang="en-GB" sz="3600" dirty="0"/>
-          </a:p>
-        </p:txBody>
-      </p:sp>
-      <p:sp>
-        <p:nvSpPr>
-          <p:cNvPr id="3" name="Content Placeholder 2"/>
-          <p:cNvSpPr>
-            <a:spLocks noGrp="1"/>
-          </p:cNvSpPr>
-          <p:nvPr>
-            <p:ph idx="1"/>
-          </p:nvPr>
-        </p:nvSpPr>
-        <p:spPr/>
-        <p:txBody>
-          <a:bodyPr/>
-          <a:lstStyle/>
-          <a:p>
-            <a:r>
-              <a:rPr lang="en-GB" dirty="0" smtClean="0"/>
-              <a:t>Works </a:t>
-            </a:r>
-            <a:r>
-              <a:rPr lang="en-GB" b="1" i="1" dirty="0" smtClean="0">
-                <a:solidFill>
-                  <a:srgbClr val="FF0000"/>
-                </a:solidFill>
-              </a:rPr>
-              <a:t>WITH</a:t>
-            </a:r>
-            <a:r>
-              <a:rPr lang="en-GB" dirty="0" smtClean="0">
-                <a:solidFill>
-                  <a:srgbClr val="FF0000"/>
-                </a:solidFill>
-              </a:rPr>
-              <a:t> </a:t>
+              <a:rPr lang="en-GB" dirty="0" smtClean="0"/>
+              <a:t> and </a:t>
             </a:r>
             <a:r>
               <a:rPr lang="en-GB" dirty="0" err="1" smtClean="0"/>
@@ -3611,14 +3756,32 @@
             </a:r>
             <a:r>
               <a:rPr lang="en-GB" dirty="0" smtClean="0"/>
-              <a:t> rather than replacing.</a:t>
-            </a:r>
-            <a:endParaRPr lang="en-GB" b="1" i="1" dirty="0" smtClean="0"/>
-          </a:p>
-          <a:p>
-            <a:r>
-              <a:rPr lang="en-GB" dirty="0" smtClean="0"/>
-              <a:t>Execute </a:t>
+              <a:t> from R</a:t>
+            </a:r>
+            <a:endParaRPr lang="en-GB" dirty="0"/>
+          </a:p>
+        </p:txBody>
+      </p:sp>
+      <p:sp>
+        <p:nvSpPr>
+          <p:cNvPr id="3" name="Content Placeholder 2"/>
+          <p:cNvSpPr>
+            <a:spLocks noGrp="1"/>
+          </p:cNvSpPr>
+          <p:nvPr>
+            <p:ph idx="1"/>
+          </p:nvPr>
+        </p:nvSpPr>
+        <p:spPr/>
+        <p:txBody>
+          <a:bodyPr>
+            <a:normAutofit fontScale="85000" lnSpcReduction="20000"/>
+          </a:bodyPr>
+          <a:lstStyle/>
+          <a:p>
+            <a:r>
+              <a:rPr lang="en-GB" dirty="0" smtClean="0"/>
+              <a:t>Run </a:t>
             </a:r>
             <a:r>
               <a:rPr lang="en-GB" dirty="0" err="1" smtClean="0"/>
@@ -3626,13 +3789,7 @@
             </a:r>
             <a:r>
               <a:rPr lang="en-GB" dirty="0" smtClean="0"/>
-              <a:t> steps from R</a:t>
-            </a:r>
-          </a:p>
-          <a:p>
-            <a:r>
-              <a:rPr lang="en-GB" dirty="0" smtClean="0"/>
-              <a:t>Run </a:t>
+              <a:t> and </a:t>
             </a:r>
             <a:r>
               <a:rPr lang="en-GB" dirty="0" err="1" smtClean="0"/>
@@ -3640,50 +3797,99 @@
             </a:r>
             <a:r>
               <a:rPr lang="en-GB" dirty="0" smtClean="0"/>
-              <a:t> routines from R.</a:t>
-            </a:r>
-          </a:p>
-          <a:p>
-            <a:r>
-              <a:rPr lang="en-GB" dirty="0" smtClean="0"/>
-              <a:t>Workflow of </a:t>
+              <a:t> using existing control streams from within R.</a:t>
+            </a:r>
+          </a:p>
+          <a:p>
+            <a:pPr lvl="1"/>
+            <a:r>
+              <a:rPr lang="en-GB" dirty="0" smtClean="0"/>
+              <a:t>Command prompt running (using R function </a:t>
+            </a:r>
+            <a:r>
+              <a:rPr lang="en-GB" b="1" dirty="0" smtClean="0">
+                <a:latin typeface="Courier New" panose="02070309020205020404" pitchFamily="49" charset="0"/>
+                <a:cs typeface="Courier New" panose="02070309020205020404" pitchFamily="49" charset="0"/>
+              </a:rPr>
+              <a:t>sys</a:t>
+            </a:r>
+            <a:r>
+              <a:rPr lang="en-GB" dirty="0" smtClean="0"/>
+              <a:t>).</a:t>
+            </a:r>
+          </a:p>
+          <a:p>
+            <a:r>
+              <a:rPr lang="en-GB" dirty="0" smtClean="0"/>
+              <a:t>Use R to modify </a:t>
             </a:r>
             <a:r>
               <a:rPr lang="en-GB" dirty="0" err="1" smtClean="0"/>
-              <a:t>PsN</a:t>
-            </a:r>
-            <a:r>
-              <a:rPr lang="en-GB" dirty="0" smtClean="0"/>
-              <a:t> could be extended with </a:t>
+              <a:t>NMTRAN</a:t>
+            </a:r>
+            <a:r>
+              <a:rPr lang="en-GB" dirty="0" smtClean="0"/>
+              <a:t> control streams and write back to file.</a:t>
+            </a:r>
+          </a:p>
+          <a:p>
+            <a:pPr lvl="1"/>
+            <a:r>
+              <a:rPr lang="en-GB" dirty="0" smtClean="0"/>
+              <a:t>Use </a:t>
             </a:r>
             <a:r>
               <a:rPr lang="en-GB" dirty="0" err="1" smtClean="0"/>
-              <a:t>rspeaksnonmem</a:t>
-            </a:r>
-            <a:r>
-              <a:rPr lang="en-GB" dirty="0" smtClean="0"/>
-              <a:t> but it doesn’t replace functionality.</a:t>
-            </a:r>
+              <a:t>RNMImport</a:t>
+            </a:r>
+            <a:r>
+              <a:rPr lang="en-GB" dirty="0" smtClean="0"/>
+              <a:t> function </a:t>
+            </a:r>
+            <a:r>
+              <a:rPr lang="en-GB" dirty="0" err="1" smtClean="0"/>
+              <a:t>importNmMod</a:t>
+            </a:r>
+            <a:r>
+              <a:rPr lang="en-GB" dirty="0" smtClean="0"/>
+              <a:t> to parse </a:t>
+            </a:r>
+            <a:r>
+              <a:rPr lang="en-GB" dirty="0" err="1" smtClean="0"/>
+              <a:t>NMTRAN</a:t>
+            </a:r>
+            <a:r>
+              <a:rPr lang="en-GB" dirty="0" smtClean="0"/>
+              <a:t>.</a:t>
+            </a:r>
+          </a:p>
+          <a:p>
+            <a:r>
+              <a:rPr lang="en-GB" dirty="0" smtClean="0"/>
+              <a:t>Build workflows using R to run several modelling steps and capture output using Notebooks or </a:t>
+            </a:r>
+            <a:r>
+              <a:rPr lang="en-GB" dirty="0" err="1" smtClean="0"/>
+              <a:t>knitr</a:t>
+            </a:r>
+            <a:r>
+              <a:rPr lang="en-GB" dirty="0" smtClean="0"/>
+              <a:t> reports.</a:t>
+            </a:r>
+            <a:endParaRPr lang="en-GB" dirty="0"/>
           </a:p>
         </p:txBody>
       </p:sp>
     </p:spTree>
     <p:extLst>
       <p:ext uri="{BB962C8B-B14F-4D97-AF65-F5344CB8AC3E}">
-        <p14:creationId xmlns:p14="http://schemas.microsoft.com/office/powerpoint/2010/main" val="1973562726"/>
+        <p14:creationId xmlns:p14="http://schemas.microsoft.com/office/powerpoint/2010/main" val="1996165554"/>
       </p:ext>
     </p:extLst>
   </p:cSld>
   <p:clrMapOvr>
     <a:masterClrMapping/>
   </p:clrMapOvr>
-  <p:timing>
-    <p:tnLst>
-      <p:par>
-        <p:cTn id="1" dur="indefinite" restart="never" nodeType="tmRoot"/>
-      </p:par>
-    </p:tnLst>
-  </p:timing>
 </p:sld>
 </file>
 
@@ -3721,7 +3927,30 @@
           <a:p>
             <a:r>
               <a:rPr lang="en-GB" dirty="0" smtClean="0"/>
-              <a:t>Running </a:t>
+              <a:t>Reproducibility</a:t>
+            </a:r>
+            <a:endParaRPr lang="en-GB" dirty="0"/>
+          </a:p>
+        </p:txBody>
+      </p:sp>
+      <p:sp>
+        <p:nvSpPr>
+          <p:cNvPr id="3" name="Content Placeholder 2"/>
+          <p:cNvSpPr>
+            <a:spLocks noGrp="1"/>
+          </p:cNvSpPr>
+          <p:nvPr>
+            <p:ph idx="1"/>
+          </p:nvPr>
+        </p:nvSpPr>
+        <p:spPr/>
+        <p:txBody>
+          <a:bodyPr/>
+          <a:lstStyle/>
+          <a:p>
+            <a:r>
+              <a:rPr lang="en-GB" dirty="0" smtClean="0"/>
+              <a:t>Tweaking </a:t>
             </a:r>
             <a:r>
               <a:rPr lang="en-GB" dirty="0" err="1" smtClean="0"/>
@@ -3729,148 +3958,69 @@
             </a:r>
             <a:r>
               <a:rPr lang="en-GB" dirty="0" smtClean="0"/>
-              <a:t> and </a:t>
+              <a:t> template models via R scripts.</a:t>
+            </a:r>
+          </a:p>
+          <a:p>
+            <a:pPr lvl="1"/>
+            <a:r>
+              <a:rPr lang="en-GB" dirty="0" smtClean="0"/>
+              <a:t>E.g. updating initial estimates</a:t>
+            </a:r>
+          </a:p>
+          <a:p>
+            <a:pPr lvl="1"/>
+            <a:r>
+              <a:rPr lang="en-GB" dirty="0" smtClean="0"/>
+              <a:t>Fixing &amp; “unfixing” parameters.</a:t>
+            </a:r>
+          </a:p>
+          <a:p>
+            <a:pPr lvl="1"/>
+            <a:r>
+              <a:rPr lang="en-GB" dirty="0" smtClean="0"/>
+              <a:t>Changing $DATA or $INPUT statements</a:t>
+            </a:r>
+          </a:p>
+          <a:p>
+            <a:pPr lvl="1"/>
+            <a:r>
+              <a:rPr lang="en-GB" dirty="0" smtClean="0"/>
+              <a:t>Changing $</a:t>
             </a:r>
             <a:r>
               <a:rPr lang="en-GB" dirty="0" err="1" smtClean="0"/>
-              <a:t>PsN</a:t>
-            </a:r>
-            <a:r>
-              <a:rPr lang="en-GB" dirty="0" smtClean="0"/>
-              <a:t> from R</a:t>
-            </a:r>
-            <a:endParaRPr lang="en-GB" dirty="0"/>
-          </a:p>
-        </p:txBody>
-      </p:sp>
-      <p:sp>
-        <p:nvSpPr>
-          <p:cNvPr id="3" name="Content Placeholder 2"/>
-          <p:cNvSpPr>
-            <a:spLocks noGrp="1"/>
-          </p:cNvSpPr>
-          <p:nvPr>
-            <p:ph idx="1"/>
-          </p:nvPr>
-        </p:nvSpPr>
-        <p:spPr/>
-        <p:txBody>
-          <a:bodyPr>
-            <a:normAutofit fontScale="85000" lnSpcReduction="20000"/>
-          </a:bodyPr>
-          <a:lstStyle/>
-          <a:p>
-            <a:r>
-              <a:rPr lang="en-GB" dirty="0" smtClean="0"/>
-              <a:t>Run </a:t>
-            </a:r>
-            <a:r>
-              <a:rPr lang="en-GB" dirty="0" err="1" smtClean="0"/>
-              <a:t>NONMEM</a:t>
-            </a:r>
-            <a:r>
-              <a:rPr lang="en-GB" dirty="0" smtClean="0"/>
-              <a:t> and </a:t>
-            </a:r>
-            <a:r>
-              <a:rPr lang="en-GB" dirty="0" err="1" smtClean="0"/>
-              <a:t>PsN</a:t>
-            </a:r>
-            <a:r>
-              <a:rPr lang="en-GB" dirty="0" smtClean="0"/>
-              <a:t> using existing control streams from within R.</a:t>
-            </a:r>
-          </a:p>
-          <a:p>
-            <a:pPr lvl="1"/>
-            <a:r>
-              <a:rPr lang="en-GB" dirty="0" smtClean="0"/>
-              <a:t>Command prompt running (using R function </a:t>
-            </a:r>
-            <a:r>
-              <a:rPr lang="en-GB" b="1" dirty="0" smtClean="0">
-                <a:latin typeface="Courier New" panose="02070309020205020404" pitchFamily="49" charset="0"/>
-                <a:cs typeface="Courier New" panose="02070309020205020404" pitchFamily="49" charset="0"/>
-              </a:rPr>
-              <a:t>sys</a:t>
-            </a:r>
-            <a:r>
-              <a:rPr lang="en-GB" dirty="0" smtClean="0"/>
-              <a:t>).</a:t>
-            </a:r>
-          </a:p>
-          <a:p>
-            <a:r>
-              <a:rPr lang="en-GB" dirty="0" smtClean="0"/>
-              <a:t>Use R to modify </a:t>
-            </a:r>
-            <a:r>
-              <a:rPr lang="en-GB" dirty="0" err="1" smtClean="0"/>
-              <a:t>NMTRAN</a:t>
-            </a:r>
-            <a:r>
-              <a:rPr lang="en-GB" dirty="0" smtClean="0"/>
-              <a:t> control streams and write back to file.</a:t>
-            </a:r>
-          </a:p>
-          <a:p>
-            <a:pPr lvl="1"/>
-            <a:r>
-              <a:rPr lang="en-GB" dirty="0" smtClean="0"/>
-              <a:t>Use </a:t>
-            </a:r>
-            <a:r>
-              <a:rPr lang="en-GB" dirty="0" err="1" smtClean="0"/>
-              <a:t>RNMImport</a:t>
-            </a:r>
-            <a:r>
-              <a:rPr lang="en-GB" dirty="0" smtClean="0"/>
-              <a:t> function </a:t>
-            </a:r>
-            <a:r>
-              <a:rPr lang="en-GB" dirty="0" err="1" smtClean="0"/>
-              <a:t>importNmMod</a:t>
-            </a:r>
-            <a:r>
-              <a:rPr lang="en-GB" dirty="0" smtClean="0"/>
-              <a:t> to parse </a:t>
-            </a:r>
-            <a:r>
-              <a:rPr lang="en-GB" dirty="0" err="1" smtClean="0"/>
-              <a:t>NMTRAN</a:t>
-            </a:r>
-            <a:r>
-              <a:rPr lang="en-GB" dirty="0" smtClean="0"/>
-              <a:t>.</a:t>
-            </a:r>
-          </a:p>
-          <a:p>
-            <a:r>
-              <a:rPr lang="en-GB" dirty="0" smtClean="0"/>
-              <a:t>Build workflows using R to run several modelling steps and capture output using Notebooks or </a:t>
-            </a:r>
-            <a:r>
-              <a:rPr lang="en-GB" dirty="0" err="1" smtClean="0"/>
-              <a:t>knitr</a:t>
-            </a:r>
-            <a:r>
-              <a:rPr lang="en-GB" dirty="0" smtClean="0"/>
-              <a:t> reports.</a:t>
-            </a:r>
-            <a:endParaRPr lang="en-GB" dirty="0"/>
+              <a:t>EST</a:t>
+            </a:r>
+            <a:r>
+              <a:rPr lang="en-GB" dirty="0" smtClean="0"/>
+              <a:t> or $</a:t>
+            </a:r>
+            <a:r>
+              <a:rPr lang="en-GB" smtClean="0"/>
+              <a:t>TABLE statements</a:t>
+            </a:r>
+            <a:endParaRPr lang="en-GB" dirty="0" smtClean="0"/>
           </a:p>
         </p:txBody>
       </p:sp>
     </p:spTree>
     <p:extLst>
       <p:ext uri="{BB962C8B-B14F-4D97-AF65-F5344CB8AC3E}">
-        <p14:creationId xmlns:p14="http://schemas.microsoft.com/office/powerpoint/2010/main" val="1996165554"/>
+        <p14:creationId xmlns:p14="http://schemas.microsoft.com/office/powerpoint/2010/main" val="303897432"/>
       </p:ext>
     </p:extLst>
   </p:cSld>
   <p:clrMapOvr>
     <a:masterClrMapping/>
   </p:clrMapOvr>
+  <p:timing>
+    <p:tnLst>
+      <p:par>
+        <p:cTn id="1" dur="indefinite" restart="never" nodeType="tmRoot"/>
+      </p:par>
+    </p:tnLst>
+  </p:timing>
 </p:sld>
 </file>
 
@@ -3908,7 +4058,11 @@
           <a:p>
             <a:r>
               <a:rPr lang="en-GB" dirty="0" smtClean="0"/>
-              <a:t>Reproducibility</a:t>
+              <a:t>Read and write </a:t>
+            </a:r>
+            <a:r>
+              <a:rPr lang="en-GB" dirty="0" err="1" smtClean="0"/>
+              <a:t>NMTRAN</a:t>
             </a:r>
             <a:endParaRPr lang="en-GB" dirty="0"/>
           </a:p>
@@ -3926,69 +4080,105 @@
         </p:nvSpPr>
         <p:spPr/>
         <p:txBody>
-          <a:bodyPr/>
-          <a:lstStyle/>
-          <a:p>
-            <a:r>
-              <a:rPr lang="en-GB" dirty="0" smtClean="0"/>
-              <a:t>Tweaking </a:t>
+          <a:bodyPr>
+            <a:normAutofit fontScale="85000" lnSpcReduction="10000"/>
+          </a:bodyPr>
+          <a:lstStyle/>
+          <a:p>
+            <a:r>
+              <a:rPr lang="en-GB" dirty="0"/>
+              <a:t>Read, parse </a:t>
+            </a:r>
+            <a:r>
+              <a:rPr lang="en-GB" dirty="0" err="1"/>
+              <a:t>NONMEM</a:t>
+            </a:r>
+            <a:r>
+              <a:rPr lang="en-GB" dirty="0"/>
+              <a:t> control files (using Mango Solutions </a:t>
+            </a:r>
+            <a:r>
+              <a:rPr lang="en-GB" dirty="0" err="1"/>
+              <a:t>RNMImport</a:t>
+            </a:r>
+            <a:r>
+              <a:rPr lang="en-GB" dirty="0"/>
+              <a:t>) </a:t>
+            </a:r>
+            <a:endParaRPr lang="en-GB" dirty="0" smtClean="0"/>
+          </a:p>
+          <a:p>
+            <a:pPr lvl="1"/>
+            <a:r>
+              <a:rPr lang="en-GB" dirty="0" smtClean="0"/>
+              <a:t>Retain RAW control stream text (character vectors)</a:t>
+            </a:r>
+          </a:p>
+          <a:p>
+            <a:pPr lvl="1"/>
+            <a:r>
+              <a:rPr lang="en-GB" dirty="0" smtClean="0"/>
+              <a:t>Parse </a:t>
             </a:r>
             <a:r>
               <a:rPr lang="en-GB" dirty="0" err="1" smtClean="0"/>
-              <a:t>NONMEM</a:t>
-            </a:r>
-            <a:r>
-              <a:rPr lang="en-GB" dirty="0" smtClean="0"/>
-              <a:t> template models via R scripts.</a:t>
+              <a:t>NMTRAN</a:t>
+            </a:r>
+            <a:r>
+              <a:rPr lang="en-GB" dirty="0" smtClean="0"/>
+              <a:t> into R objects</a:t>
+            </a:r>
+          </a:p>
+          <a:p>
+            <a:r>
+              <a:rPr lang="en-GB" dirty="0" smtClean="0"/>
+              <a:t>Write parsed objects to </a:t>
+            </a:r>
+            <a:r>
+              <a:rPr lang="en-GB" dirty="0"/>
+              <a:t>file using </a:t>
+            </a:r>
+            <a:r>
+              <a:rPr lang="en-GB" dirty="0" err="1"/>
+              <a:t>rspeaksnonmem</a:t>
+            </a:r>
+            <a:r>
+              <a:rPr lang="en-GB" dirty="0" smtClean="0"/>
+              <a:t>.</a:t>
             </a:r>
           </a:p>
           <a:p>
             <a:pPr lvl="1"/>
             <a:r>
               <a:rPr lang="en-GB" dirty="0" smtClean="0"/>
-              <a:t>E.g. updating initial estimates</a:t>
+              <a:t>Uses template (reference) model to order statements.</a:t>
             </a:r>
           </a:p>
           <a:p>
             <a:pPr lvl="1"/>
             <a:r>
               <a:rPr lang="en-GB" dirty="0" smtClean="0"/>
-              <a:t>Fixing &amp; “unfixing” parameters.</a:t>
-            </a:r>
-          </a:p>
-          <a:p>
-            <a:pPr lvl="1"/>
-            <a:r>
-              <a:rPr lang="en-GB" dirty="0" smtClean="0"/>
-              <a:t>Changing $DATA or $INPUT statements</a:t>
-            </a:r>
-          </a:p>
-          <a:p>
-            <a:pPr lvl="1"/>
-            <a:r>
-              <a:rPr lang="en-GB" dirty="0" smtClean="0"/>
-              <a:t>Changing $</a:t>
+              <a:t>Treat the “model” objects (e.g. $</a:t>
             </a:r>
             <a:r>
               <a:rPr lang="en-GB" dirty="0" err="1" smtClean="0"/>
-              <a:t>EST</a:t>
-            </a:r>
-            <a:r>
-              <a:rPr lang="en-GB" dirty="0" smtClean="0"/>
-              <a:t> or $</a:t>
-            </a:r>
-            <a:r>
-              <a:rPr lang="en-GB" smtClean="0"/>
-              <a:t>TABLE statements</a:t>
-            </a:r>
-            <a:endParaRPr lang="en-GB" dirty="0" smtClean="0"/>
+              <a:t>PK</a:t>
+            </a:r>
+            <a:r>
+              <a:rPr lang="en-GB" dirty="0" smtClean="0"/>
+              <a:t>, $DES, $SUB, $ERROR) as unmodifiable.</a:t>
+            </a:r>
+            <a:endParaRPr lang="en-GB" dirty="0"/>
+          </a:p>
+          <a:p>
+            <a:endParaRPr lang="en-GB" dirty="0"/>
           </a:p>
         </p:txBody>
       </p:sp>
     </p:spTree>
     <p:extLst>
       <p:ext uri="{BB962C8B-B14F-4D97-AF65-F5344CB8AC3E}">
-        <p14:creationId xmlns:p14="http://schemas.microsoft.com/office/powerpoint/2010/main" val="303897432"/>
+        <p14:creationId xmlns:p14="http://schemas.microsoft.com/office/powerpoint/2010/main" val="1059347545"/>
       </p:ext>
     </p:extLst>
   </p:cSld>
@@ -4039,127 +4229,79 @@
           <a:p>
             <a:r>
               <a:rPr lang="en-GB" dirty="0" smtClean="0"/>
-              <a:t>Read and write </a:t>
-            </a:r>
+              <a:t>Update objects</a:t>
+            </a:r>
+            <a:endParaRPr lang="en-GB" dirty="0"/>
+          </a:p>
+        </p:txBody>
+      </p:sp>
+      <p:sp>
+        <p:nvSpPr>
+          <p:cNvPr id="3" name="Content Placeholder 2"/>
+          <p:cNvSpPr>
+            <a:spLocks noGrp="1"/>
+          </p:cNvSpPr>
+          <p:nvPr>
+            <p:ph idx="1"/>
+          </p:nvPr>
+        </p:nvSpPr>
+        <p:spPr/>
+        <p:txBody>
+          <a:bodyPr>
+            <a:normAutofit fontScale="92500"/>
+          </a:bodyPr>
+          <a:lstStyle/>
+          <a:p>
+            <a:r>
+              <a:rPr lang="en-GB" dirty="0" smtClean="0"/>
+              <a:t>Substitute </a:t>
+            </a:r>
+            <a:r>
+              <a:rPr lang="en-GB" b="1" i="1" dirty="0" smtClean="0"/>
+              <a:t>parsed</a:t>
+            </a:r>
+            <a:r>
+              <a:rPr lang="en-GB" dirty="0" smtClean="0"/>
+              <a:t> objects to create a new object.</a:t>
+            </a:r>
+          </a:p>
+          <a:p>
+            <a:pPr lvl="1"/>
+            <a:r>
+              <a:rPr lang="en-GB" dirty="0" smtClean="0"/>
+              <a:t>E.g. update $THETA, $OMEGA, $SIGMA with final estimates.</a:t>
+            </a:r>
+          </a:p>
+          <a:p>
+            <a:pPr lvl="1"/>
+            <a:r>
+              <a:rPr lang="en-GB" dirty="0" smtClean="0"/>
+              <a:t>E.g. Fix parameters to zero etc.</a:t>
+            </a:r>
+          </a:p>
+          <a:p>
             <a:r>
               <a:rPr lang="en-GB" dirty="0" err="1" smtClean="0"/>
-              <a:t>NMTRAN</a:t>
-            </a:r>
-            <a:endParaRPr lang="en-GB" dirty="0"/>
-          </a:p>
-        </p:txBody>
-      </p:sp>
-      <p:sp>
-        <p:nvSpPr>
-          <p:cNvPr id="3" name="Content Placeholder 2"/>
-          <p:cNvSpPr>
-            <a:spLocks noGrp="1"/>
-          </p:cNvSpPr>
-          <p:nvPr>
-            <p:ph idx="1"/>
-          </p:nvPr>
-        </p:nvSpPr>
-        <p:spPr/>
-        <p:txBody>
-          <a:bodyPr>
-            <a:normAutofit fontScale="85000" lnSpcReduction="10000"/>
-          </a:bodyPr>
-          <a:lstStyle/>
-          <a:p>
-            <a:r>
-              <a:rPr lang="en-GB" dirty="0"/>
-              <a:t>Read, parse </a:t>
-            </a:r>
-            <a:r>
-              <a:rPr lang="en-GB" dirty="0" err="1"/>
-              <a:t>NONMEM</a:t>
-            </a:r>
-            <a:r>
-              <a:rPr lang="en-GB" dirty="0"/>
-              <a:t> control files (using Mango Solutions </a:t>
-            </a:r>
-            <a:r>
-              <a:rPr lang="en-GB" dirty="0" err="1"/>
-              <a:t>RNMImport</a:t>
-            </a:r>
-            <a:r>
-              <a:rPr lang="en-GB" dirty="0"/>
-              <a:t>) </a:t>
-            </a:r>
-            <a:endParaRPr lang="en-GB" dirty="0" smtClean="0"/>
+              <a:t>metrumrg</a:t>
+            </a:r>
+            <a:r>
+              <a:rPr lang="en-GB" dirty="0" smtClean="0"/>
+              <a:t> works by manipulating vectors of character strings.</a:t>
+            </a:r>
           </a:p>
           <a:p>
             <a:pPr lvl="1"/>
             <a:r>
               <a:rPr lang="en-GB" dirty="0" smtClean="0"/>
-              <a:t>Retain RAW control stream text (character vectors)</a:t>
-            </a:r>
-          </a:p>
-          <a:p>
-            <a:pPr lvl="1"/>
-            <a:r>
-              <a:rPr lang="en-GB" dirty="0" smtClean="0"/>
-              <a:t>Parse </a:t>
-            </a:r>
-            <a:r>
-              <a:rPr lang="en-GB" dirty="0" err="1" smtClean="0"/>
-              <a:t>NMTRAN</a:t>
-            </a:r>
-            <a:r>
-              <a:rPr lang="en-GB" dirty="0" smtClean="0"/>
-              <a:t> into R objects</a:t>
-            </a:r>
-          </a:p>
-          <a:p>
-            <a:r>
-              <a:rPr lang="en-GB" dirty="0" smtClean="0"/>
-              <a:t>Write parsed objects to </a:t>
-            </a:r>
-            <a:r>
-              <a:rPr lang="en-GB" dirty="0"/>
-              <a:t>file using </a:t>
-            </a:r>
-            <a:r>
-              <a:rPr lang="en-GB" dirty="0" err="1"/>
-              <a:t>rspeaksnonmem</a:t>
-            </a:r>
-            <a:r>
-              <a:rPr lang="en-GB" dirty="0" smtClean="0"/>
-              <a:t>.</a:t>
-            </a:r>
-          </a:p>
-          <a:p>
-            <a:pPr lvl="1"/>
-            <a:r>
-              <a:rPr lang="en-GB" dirty="0" smtClean="0"/>
-              <a:t>Uses template (reference) model to order statements.</a:t>
-            </a:r>
-          </a:p>
-          <a:p>
-            <a:pPr lvl="1"/>
-            <a:r>
-              <a:rPr lang="en-GB" dirty="0" smtClean="0"/>
-              <a:t>Treat the “model” objects (e.g. $</a:t>
-            </a:r>
-            <a:r>
-              <a:rPr lang="en-GB" dirty="0" err="1" smtClean="0"/>
-              <a:t>PK</a:t>
-            </a:r>
-            <a:r>
-              <a:rPr lang="en-GB" dirty="0" smtClean="0"/>
-              <a:t>, $DES, $SUB, $ERROR) as unmodifiable.</a:t>
-            </a:r>
-            <a:endParaRPr lang="en-GB" dirty="0"/>
-          </a:p>
-          <a:p>
-            <a:endParaRPr lang="en-GB" dirty="0"/>
+              <a:t>There are pros and cons to both solutions.</a:t>
+            </a:r>
           </a:p>
         </p:txBody>
       </p:sp>
     </p:spTree>
     <p:extLst>
       <p:ext uri="{BB962C8B-B14F-4D97-AF65-F5344CB8AC3E}">
-        <p14:creationId xmlns:p14="http://schemas.microsoft.com/office/powerpoint/2010/main" val="1059347545"/>
+        <p14:creationId xmlns:p14="http://schemas.microsoft.com/office/powerpoint/2010/main" val="2573110890"/>
       </p:ext>
     </p:extLst>
   </p:cSld>
@@ -4205,12 +4347,18 @@
         </p:nvSpPr>
         <p:spPr/>
         <p:txBody>
-          <a:bodyPr/>
-          <a:lstStyle/>
-          <a:p>
-            <a:r>
-              <a:rPr lang="en-GB" dirty="0" smtClean="0"/>
-              <a:t>Update objects</a:t>
+          <a:bodyPr>
+            <a:normAutofit fontScale="90000"/>
+          </a:bodyPr>
+          <a:lstStyle/>
+          <a:p>
+            <a:r>
+              <a:rPr lang="en-GB" dirty="0" err="1" smtClean="0"/>
+              <a:t>rspeaksnonmem</a:t>
+            </a:r>
+            <a:r>
+              <a:rPr lang="en-GB" dirty="0" smtClean="0"/>
+              <a:t> = collection of tools</a:t>
             </a:r>
             <a:endParaRPr lang="en-GB" dirty="0"/>
           </a:p>
@@ -4229,73 +4377,164 @@
         <p:spPr/>
         <p:txBody>
           <a:bodyPr>
-            <a:normAutofit fontScale="92500"/>
+            <a:normAutofit fontScale="77500" lnSpcReduction="20000"/>
           </a:bodyPr>
           <a:lstStyle/>
           <a:p>
             <a:r>
               <a:rPr lang="en-GB" dirty="0" smtClean="0"/>
-              <a:t>Substitute </a:t>
-            </a:r>
-            <a:r>
-              <a:rPr lang="en-GB" b="1" i="1" dirty="0" smtClean="0"/>
-              <a:t>parsed</a:t>
-            </a:r>
-            <a:r>
-              <a:rPr lang="en-GB" dirty="0" smtClean="0"/>
-              <a:t> objects to create a new object.</a:t>
+              <a:t>Extracting elements of </a:t>
+            </a:r>
+            <a:r>
+              <a:rPr lang="en-GB" dirty="0" err="1" smtClean="0"/>
+              <a:t>NMTRAN</a:t>
+            </a:r>
+            <a:r>
+              <a:rPr lang="en-GB" dirty="0" smtClean="0"/>
+              <a:t> control stream:</a:t>
             </a:r>
           </a:p>
           <a:p>
             <a:pPr lvl="1"/>
             <a:r>
               <a:rPr lang="en-GB" dirty="0" smtClean="0"/>
-              <a:t>E.g. update $THETA, $OMEGA, $SIGMA with final estimates.</a:t>
+              <a:t>E.g. </a:t>
+            </a:r>
+            <a:r>
+              <a:rPr lang="en-GB" dirty="0" err="1" smtClean="0"/>
+              <a:t>getNMBlocks</a:t>
+            </a:r>
+            <a:r>
+              <a:rPr lang="en-GB" dirty="0" smtClean="0"/>
+              <a:t>, </a:t>
+            </a:r>
+            <a:r>
+              <a:rPr lang="en-GB" dirty="0" err="1" smtClean="0"/>
+              <a:t>getNMDataObjects</a:t>
+            </a:r>
+            <a:r>
+              <a:rPr lang="en-GB" dirty="0" smtClean="0"/>
+              <a:t>, etc.</a:t>
+            </a:r>
+          </a:p>
+          <a:p>
+            <a:r>
+              <a:rPr lang="en-GB" dirty="0" smtClean="0"/>
+              <a:t>Updating parsed objects:</a:t>
             </a:r>
           </a:p>
           <a:p>
             <a:pPr lvl="1"/>
             <a:r>
-              <a:rPr lang="en-GB" dirty="0" smtClean="0"/>
-              <a:t>E.g. Fix parameters to zero etc.</a:t>
-            </a:r>
-          </a:p>
-          <a:p>
-            <a:r>
               <a:rPr lang="en-GB" dirty="0" err="1" smtClean="0"/>
-              <a:t>metrumrg</a:t>
-            </a:r>
-            <a:r>
-              <a:rPr lang="en-GB" dirty="0" smtClean="0"/>
-              <a:t> works by manipulating vectors of character strings.</a:t>
+              <a:t>updateModel</a:t>
+            </a:r>
+            <a:endParaRPr lang="en-GB" dirty="0" smtClean="0"/>
+          </a:p>
+          <a:p>
+            <a:r>
+              <a:rPr lang="en-GB" dirty="0" smtClean="0"/>
+              <a:t>Writing parsed objects to file</a:t>
             </a:r>
           </a:p>
           <a:p>
             <a:pPr lvl="1"/>
             <a:r>
-              <a:rPr lang="en-GB" dirty="0" smtClean="0"/>
-              <a:t>There are pros and cons to both solutions.</a:t>
-            </a:r>
+              <a:rPr lang="en-GB" dirty="0" err="1" smtClean="0"/>
+              <a:t>writeNMControlStream</a:t>
+            </a:r>
+            <a:endParaRPr lang="en-GB" dirty="0" smtClean="0"/>
+          </a:p>
+          <a:p>
+            <a:r>
+              <a:rPr lang="en-GB" dirty="0" smtClean="0"/>
+              <a:t>Running </a:t>
+            </a:r>
+            <a:r>
+              <a:rPr lang="en-GB" dirty="0" err="1" smtClean="0"/>
+              <a:t>NONMEM</a:t>
+            </a:r>
+            <a:r>
+              <a:rPr lang="en-GB" dirty="0" smtClean="0"/>
+              <a:t> &amp; </a:t>
+            </a:r>
+            <a:r>
+              <a:rPr lang="en-GB" dirty="0" err="1" smtClean="0"/>
+              <a:t>PsN</a:t>
+            </a:r>
+            <a:r>
+              <a:rPr lang="en-GB" dirty="0" smtClean="0"/>
+              <a:t> from R</a:t>
+            </a:r>
+          </a:p>
+          <a:p>
+            <a:pPr lvl="1"/>
+            <a:r>
+              <a:rPr lang="en-GB" dirty="0" err="1" smtClean="0"/>
+              <a:t>defineExecutable</a:t>
+            </a:r>
+            <a:r>
+              <a:rPr lang="en-GB" dirty="0" smtClean="0"/>
+              <a:t>, </a:t>
+            </a:r>
+            <a:r>
+              <a:rPr lang="en-GB" dirty="0" err="1" smtClean="0"/>
+              <a:t>estimate_NM</a:t>
+            </a:r>
+            <a:r>
+              <a:rPr lang="en-GB" dirty="0" smtClean="0"/>
+              <a:t>, </a:t>
+            </a:r>
+            <a:r>
+              <a:rPr lang="en-GB" dirty="0" err="1" smtClean="0"/>
+              <a:t>execute_PsN</a:t>
+            </a:r>
+            <a:r>
+              <a:rPr lang="en-GB" dirty="0" smtClean="0"/>
+              <a:t>, </a:t>
+            </a:r>
+            <a:r>
+              <a:rPr lang="en-GB" dirty="0" err="1" smtClean="0"/>
+              <a:t>sumo_PsN</a:t>
+            </a:r>
+            <a:r>
+              <a:rPr lang="en-GB" dirty="0" smtClean="0"/>
+              <a:t>, </a:t>
+            </a:r>
+            <a:r>
+              <a:rPr lang="en-GB" dirty="0" err="1" smtClean="0"/>
+              <a:t>bootstrap_PsN</a:t>
+            </a:r>
+            <a:r>
+              <a:rPr lang="en-GB" dirty="0" smtClean="0"/>
+              <a:t>, </a:t>
+            </a:r>
+            <a:r>
+              <a:rPr lang="en-GB" dirty="0" err="1" smtClean="0"/>
+              <a:t>VPC_PsN</a:t>
+            </a:r>
+            <a:r>
+              <a:rPr lang="en-GB" dirty="0" smtClean="0"/>
+              <a:t>, </a:t>
+            </a:r>
+            <a:r>
+              <a:rPr lang="en-GB" dirty="0" err="1" smtClean="0"/>
+              <a:t>runRecord_PsN</a:t>
+            </a:r>
+            <a:endParaRPr lang="en-GB" dirty="0"/>
           </a:p>
         </p:txBody>
       </p:sp>
     </p:spTree>
     <p:extLst>
       <p:ext uri="{BB962C8B-B14F-4D97-AF65-F5344CB8AC3E}">
-        <p14:creationId xmlns:p14="http://schemas.microsoft.com/office/powerpoint/2010/main" val="2573110890"/>
+        <p14:creationId xmlns:p14="http://schemas.microsoft.com/office/powerpoint/2010/main" val="40793400"/>
       </p:ext>
     </p:extLst>
   </p:cSld>
   <p:clrMapOvr>
     <a:masterClrMapping/>
   </p:clrMapOvr>
-  <p:timing>
-    <p:tnLst>
-      <p:par>
-        <p:cTn id="1" dur="indefinite" restart="never" nodeType="tmRoot"/>
-      </p:par>
-    </p:tnLst>
-  </p:timing>
 </p:sld>
 </file>
 
@@ -4328,18 +4567,12 @@
         </p:nvSpPr>
         <p:spPr/>
         <p:txBody>
-          <a:bodyPr>
-            <a:normAutofit fontScale="90000"/>
-          </a:bodyPr>
-          <a:lstStyle/>
-          <a:p>
-            <a:r>
-              <a:rPr lang="en-GB" dirty="0" err="1" smtClean="0"/>
-              <a:t>rspeaksnonmem</a:t>
-            </a:r>
-            <a:r>
-              <a:rPr lang="en-GB" dirty="0" smtClean="0"/>
-              <a:t> = collection of tools</a:t>
+          <a:bodyPr/>
+          <a:lstStyle/>
+          <a:p>
+            <a:r>
+              <a:rPr lang="en-GB" dirty="0" smtClean="0"/>
+              <a:t>Write your own workflow!</a:t>
             </a:r>
             <a:endParaRPr lang="en-GB" dirty="0"/>
           </a:p>
@@ -4357,79 +4590,12 @@
         </p:nvSpPr>
         <p:spPr/>
         <p:txBody>
-          <a:bodyPr>
-            <a:normAutofit fontScale="77500" lnSpcReduction="20000"/>
-          </a:bodyPr>
-          <a:lstStyle/>
-          <a:p>
-            <a:r>
-              <a:rPr lang="en-GB" dirty="0" smtClean="0"/>
-              <a:t>Extracting elements of </a:t>
-            </a:r>
-            <a:r>
-              <a:rPr lang="en-GB" dirty="0" err="1" smtClean="0"/>
-              <a:t>NMTRAN</a:t>
-            </a:r>
-            <a:r>
-              <a:rPr lang="en-GB" dirty="0" smtClean="0"/>
-              <a:t> control stream:</a:t>
-            </a:r>
-          </a:p>
-          <a:p>
-            <a:pPr lvl="1"/>
-            <a:r>
-              <a:rPr lang="en-GB" dirty="0" smtClean="0"/>
-              <a:t>E.g. </a:t>
-            </a:r>
-            <a:r>
-              <a:rPr lang="en-GB" dirty="0" err="1" smtClean="0"/>
-              <a:t>getNMBlocks</a:t>
-            </a:r>
-            <a:r>
-              <a:rPr lang="en-GB" dirty="0" smtClean="0"/>
-              <a:t>, </a:t>
-            </a:r>
-            <a:r>
-              <a:rPr lang="en-GB" dirty="0" err="1" smtClean="0"/>
-              <a:t>getNMDataObjects</a:t>
-            </a:r>
-            <a:r>
-              <a:rPr lang="en-GB" dirty="0" smtClean="0"/>
-              <a:t>, etc.</a:t>
-            </a:r>
-          </a:p>
-          <a:p>
-            <a:r>
-              <a:rPr lang="en-GB" dirty="0" smtClean="0"/>
-              <a:t>Updating parsed objects:</a:t>
-            </a:r>
-          </a:p>
-          <a:p>
-            <a:pPr lvl="1"/>
-            <a:r>
-              <a:rPr lang="en-GB" dirty="0" err="1" smtClean="0"/>
-              <a:t>updateModel</a:t>
-            </a:r>
-            <a:endParaRPr lang="en-GB" dirty="0" smtClean="0"/>
-          </a:p>
-          <a:p>
-            <a:r>
-              <a:rPr lang="en-GB" dirty="0" smtClean="0"/>
-              <a:t>Writing parsed objects to file</a:t>
-            </a:r>
-          </a:p>
-          <a:p>
-            <a:pPr lvl="1"/>
-            <a:r>
-              <a:rPr lang="en-GB" dirty="0" err="1" smtClean="0"/>
-              <a:t>writeNMControlStream</a:t>
-            </a:r>
-            <a:endParaRPr lang="en-GB" dirty="0" smtClean="0"/>
-          </a:p>
-          <a:p>
-            <a:r>
-              <a:rPr lang="en-GB" dirty="0" smtClean="0"/>
-              <a:t>Running </a:t>
+          <a:bodyPr/>
+          <a:lstStyle/>
+          <a:p>
+            <a:r>
+              <a:rPr lang="en-GB" dirty="0" smtClean="0"/>
+              <a:t>What steps do you want to take on EACH </a:t>
             </a:r>
             <a:r>
               <a:rPr lang="en-GB" dirty="0" err="1" smtClean="0"/>
@@ -4437,70 +4603,31 @@
             </a:r>
             <a:r>
               <a:rPr lang="en-GB" dirty="0" smtClean="0"/>
-              <a:t> &amp; </a:t>
+              <a:t> model?</a:t>
+            </a:r>
+          </a:p>
+          <a:p>
+            <a:r>
+              <a:rPr lang="en-GB" dirty="0" smtClean="0"/>
+              <a:t>Create R markdown documents using </a:t>
             </a:r>
             <a:r>
               <a:rPr lang="en-GB" dirty="0" err="1" smtClean="0"/>
-              <a:t>PsN</a:t>
-            </a:r>
-            <a:r>
-              <a:rPr lang="en-GB" dirty="0" smtClean="0"/>
-              <a:t> from R</a:t>
-            </a:r>
-          </a:p>
-          <a:p>
-            <a:pPr lvl="1"/>
-            <a:r>
-              <a:rPr lang="en-GB" dirty="0" err="1" smtClean="0"/>
-              <a:t>defineExecutable</a:t>
-            </a:r>
-            <a:r>
-              <a:rPr lang="en-GB" dirty="0" smtClean="0"/>
-              <a:t>, </a:t>
-            </a:r>
-            <a:r>
-              <a:rPr lang="en-GB" dirty="0" err="1" smtClean="0"/>
-              <a:t>estimate_NM</a:t>
-            </a:r>
-            <a:r>
-              <a:rPr lang="en-GB" dirty="0" smtClean="0"/>
-              <a:t>, </a:t>
-            </a:r>
-            <a:r>
-              <a:rPr lang="en-GB" dirty="0" err="1" smtClean="0"/>
-              <a:t>execute_PsN</a:t>
-            </a:r>
-            <a:r>
-              <a:rPr lang="en-GB" dirty="0" smtClean="0"/>
-              <a:t>, </a:t>
-            </a:r>
-            <a:r>
-              <a:rPr lang="en-GB" dirty="0" err="1" smtClean="0"/>
-              <a:t>sumo_PsN</a:t>
-            </a:r>
-            <a:r>
-              <a:rPr lang="en-GB" dirty="0" smtClean="0"/>
-              <a:t>, </a:t>
-            </a:r>
-            <a:r>
-              <a:rPr lang="en-GB" dirty="0" err="1" smtClean="0"/>
-              <a:t>bootstrap_PsN</a:t>
-            </a:r>
-            <a:r>
-              <a:rPr lang="en-GB" dirty="0" smtClean="0"/>
-              <a:t>, </a:t>
-            </a:r>
-            <a:r>
-              <a:rPr lang="en-GB" dirty="0" err="1" smtClean="0"/>
-              <a:t>VPC_PsN</a:t>
-            </a:r>
-            <a:r>
-              <a:rPr lang="en-GB" dirty="0" smtClean="0"/>
-              <a:t>, </a:t>
-            </a:r>
-            <a:r>
-              <a:rPr lang="en-GB" dirty="0" err="1" smtClean="0"/>
-              <a:t>runRecord_PsN</a:t>
+              <a:t>knitr</a:t>
+            </a:r>
+            <a:r>
+              <a:rPr lang="en-GB" dirty="0" smtClean="0"/>
+              <a:t> to summarise each run in HTML?</a:t>
+            </a:r>
+          </a:p>
+          <a:p>
+            <a:r>
+              <a:rPr lang="en-GB" dirty="0" smtClean="0"/>
+              <a:t>Create a Shiny application to run and </a:t>
+            </a:r>
+            <a:r>
+              <a:rPr lang="en-GB" smtClean="0"/>
+              <a:t>review output?</a:t>
             </a:r>
             <a:endParaRPr lang="en-GB" dirty="0"/>
           </a:p>
@@ -4509,7 +4636,7 @@
     </p:spTree>
     <p:extLst>
       <p:ext uri="{BB962C8B-B14F-4D97-AF65-F5344CB8AC3E}">
-        <p14:creationId xmlns:p14="http://schemas.microsoft.com/office/powerpoint/2010/main" val="40793400"/>
+        <p14:creationId xmlns:p14="http://schemas.microsoft.com/office/powerpoint/2010/main" val="2077010124"/>
       </p:ext>
     </p:extLst>
   </p:cSld>

</xml_diff>